<commit_message>
Project Presentation (~15 minutes)
</commit_message>
<xml_diff>
--- a/Demonstration/Estée Lauder Hackathon 2019 – Project Presentation, ~15 Minutes.pptx
+++ b/Demonstration/Estée Lauder Hackathon 2019 – Project Presentation, ~15 Minutes.pptx
@@ -1,15 +1,18 @@
 
 <file path=ppt/presentation.xml><?xml version="1.0" encoding="utf-8"?>
-<p:presentation xmlns:a="http://schemas.openxmlformats.org/drawingml/2006/main" xmlns:r="http://schemas.openxmlformats.org/officeDocument/2006/relationships" xmlns:p="http://schemas.openxmlformats.org/presentationml/2006/main" autoCompressPictures="0">
+<p:presentation xmlns:a="http://schemas.openxmlformats.org/drawingml/2006/main" xmlns:r="http://schemas.openxmlformats.org/officeDocument/2006/relationships" xmlns:p="http://schemas.openxmlformats.org/presentationml/2006/main" saveSubsetFonts="1" autoCompressPictures="0">
   <p:sldMasterIdLst>
     <p:sldMasterId id="2147483975" r:id="rId1"/>
   </p:sldMasterIdLst>
   <p:sldIdLst>
     <p:sldId id="256" r:id="rId2"/>
     <p:sldId id="257" r:id="rId3"/>
-    <p:sldId id="258" r:id="rId4"/>
-    <p:sldId id="260" r:id="rId5"/>
-    <p:sldId id="259" r:id="rId6"/>
+    <p:sldId id="261" r:id="rId4"/>
+    <p:sldId id="262" r:id="rId5"/>
+    <p:sldId id="263" r:id="rId6"/>
+    <p:sldId id="264" r:id="rId7"/>
+    <p:sldId id="260" r:id="rId8"/>
+    <p:sldId id="259" r:id="rId9"/>
   </p:sldIdLst>
   <p:sldSz cx="12192000" cy="6858000"/>
   <p:notesSz cx="6858000" cy="9144000"/>
@@ -173,7 +176,7 @@
           <a:noFill/>
           <a:extLst>
             <a:ext uri="{909E8E84-426E-40dd-AFC4-6F175D3DCCD1}">
-              <a14:hiddenFill xmlns="" xmlns:a14="http://schemas.microsoft.com/office/drawing/2010/main">
+              <a14:hiddenFill xmlns:a14="http://schemas.microsoft.com/office/drawing/2010/main" xmlns="">
                 <a:solidFill>
                   <a:srgbClr val="FFFFFF"/>
                 </a:solidFill>
@@ -233,7 +236,7 @@
             </a:ln>
             <a:extLst>
               <a:ext uri="{91240B29-F687-4f45-9708-019B960494DF}">
-                <a14:hiddenLine xmlns="" xmlns:a14="http://schemas.microsoft.com/office/drawing/2010/main" w="9525">
+                <a14:hiddenLine xmlns:a14="http://schemas.microsoft.com/office/drawing/2010/main" xmlns="" w="9525">
                   <a:solidFill>
                     <a:srgbClr val="000000"/>
                   </a:solidFill>
@@ -323,7 +326,7 @@
             </a:ln>
             <a:extLst>
               <a:ext uri="{91240B29-F687-4f45-9708-019B960494DF}">
-                <a14:hiddenLine xmlns="" xmlns:a14="http://schemas.microsoft.com/office/drawing/2010/main" w="9525">
+                <a14:hiddenLine xmlns:a14="http://schemas.microsoft.com/office/drawing/2010/main" xmlns="" w="9525">
                   <a:solidFill>
                     <a:srgbClr val="000000"/>
                   </a:solidFill>
@@ -413,7 +416,7 @@
             </a:ln>
             <a:extLst>
               <a:ext uri="{91240B29-F687-4f45-9708-019B960494DF}">
-                <a14:hiddenLine xmlns="" xmlns:a14="http://schemas.microsoft.com/office/drawing/2010/main" w="9525">
+                <a14:hiddenLine xmlns:a14="http://schemas.microsoft.com/office/drawing/2010/main" xmlns="" w="9525">
                   <a:solidFill>
                     <a:srgbClr val="000000"/>
                   </a:solidFill>
@@ -447,7 +450,7 @@
             </a:ln>
             <a:extLst>
               <a:ext uri="{91240B29-F687-4f45-9708-019B960494DF}">
-                <a14:hiddenLine xmlns="" xmlns:a14="http://schemas.microsoft.com/office/drawing/2010/main" w="9525">
+                <a14:hiddenLine xmlns:a14="http://schemas.microsoft.com/office/drawing/2010/main" xmlns="" w="9525">
                   <a:solidFill>
                     <a:srgbClr val="000000"/>
                   </a:solidFill>
@@ -537,7 +540,7 @@
             </a:ln>
             <a:extLst>
               <a:ext uri="{91240B29-F687-4f45-9708-019B960494DF}">
-                <a14:hiddenLine xmlns="" xmlns:a14="http://schemas.microsoft.com/office/drawing/2010/main" w="9525">
+                <a14:hiddenLine xmlns:a14="http://schemas.microsoft.com/office/drawing/2010/main" xmlns="" w="9525">
                   <a:solidFill>
                     <a:srgbClr val="000000"/>
                   </a:solidFill>
@@ -599,7 +602,7 @@
             </a:ln>
             <a:extLst>
               <a:ext uri="{91240B29-F687-4f45-9708-019B960494DF}">
-                <a14:hiddenLine xmlns="" xmlns:a14="http://schemas.microsoft.com/office/drawing/2010/main" w="9525">
+                <a14:hiddenLine xmlns:a14="http://schemas.microsoft.com/office/drawing/2010/main" xmlns="" w="9525">
                   <a:solidFill>
                     <a:srgbClr val="000000"/>
                   </a:solidFill>
@@ -661,7 +664,7 @@
             </a:ln>
             <a:extLst>
               <a:ext uri="{91240B29-F687-4f45-9708-019B960494DF}">
-                <a14:hiddenLine xmlns="" xmlns:a14="http://schemas.microsoft.com/office/drawing/2010/main" w="9525">
+                <a14:hiddenLine xmlns:a14="http://schemas.microsoft.com/office/drawing/2010/main" xmlns="" w="9525">
                   <a:solidFill>
                     <a:srgbClr val="000000"/>
                   </a:solidFill>
@@ -751,7 +754,7 @@
             </a:ln>
             <a:extLst>
               <a:ext uri="{91240B29-F687-4f45-9708-019B960494DF}">
-                <a14:hiddenLine xmlns="" xmlns:a14="http://schemas.microsoft.com/office/drawing/2010/main" w="9525">
+                <a14:hiddenLine xmlns:a14="http://schemas.microsoft.com/office/drawing/2010/main" xmlns="" w="9525">
                   <a:solidFill>
                     <a:srgbClr val="000000"/>
                   </a:solidFill>
@@ -813,7 +816,7 @@
             </a:ln>
             <a:extLst>
               <a:ext uri="{91240B29-F687-4f45-9708-019B960494DF}">
-                <a14:hiddenLine xmlns="" xmlns:a14="http://schemas.microsoft.com/office/drawing/2010/main" w="9525">
+                <a14:hiddenLine xmlns:a14="http://schemas.microsoft.com/office/drawing/2010/main" xmlns="" w="9525">
                   <a:solidFill>
                     <a:srgbClr val="000000"/>
                   </a:solidFill>
@@ -875,7 +878,7 @@
             </a:ln>
             <a:extLst>
               <a:ext uri="{91240B29-F687-4f45-9708-019B960494DF}">
-                <a14:hiddenLine xmlns="" xmlns:a14="http://schemas.microsoft.com/office/drawing/2010/main" w="9525">
+                <a14:hiddenLine xmlns:a14="http://schemas.microsoft.com/office/drawing/2010/main" xmlns="" w="9525">
                   <a:solidFill>
                     <a:srgbClr val="000000"/>
                   </a:solidFill>
@@ -965,7 +968,7 @@
             </a:ln>
             <a:extLst>
               <a:ext uri="{91240B29-F687-4f45-9708-019B960494DF}">
-                <a14:hiddenLine xmlns="" xmlns:a14="http://schemas.microsoft.com/office/drawing/2010/main" w="9525">
+                <a14:hiddenLine xmlns:a14="http://schemas.microsoft.com/office/drawing/2010/main" xmlns="" w="9525">
                   <a:solidFill>
                     <a:srgbClr val="000000"/>
                   </a:solidFill>
@@ -1055,7 +1058,7 @@
             </a:ln>
             <a:extLst>
               <a:ext uri="{91240B29-F687-4f45-9708-019B960494DF}">
-                <a14:hiddenLine xmlns="" xmlns:a14="http://schemas.microsoft.com/office/drawing/2010/main" w="9525">
+                <a14:hiddenLine xmlns:a14="http://schemas.microsoft.com/office/drawing/2010/main" xmlns="" w="9525">
                   <a:solidFill>
                     <a:srgbClr val="000000"/>
                   </a:solidFill>
@@ -1117,7 +1120,7 @@
             </a:ln>
             <a:extLst>
               <a:ext uri="{91240B29-F687-4f45-9708-019B960494DF}">
-                <a14:hiddenLine xmlns="" xmlns:a14="http://schemas.microsoft.com/office/drawing/2010/main" w="9525">
+                <a14:hiddenLine xmlns:a14="http://schemas.microsoft.com/office/drawing/2010/main" xmlns="" w="9525">
                   <a:solidFill>
                     <a:srgbClr val="000000"/>
                   </a:solidFill>
@@ -1227,7 +1230,7 @@
             </a:ln>
             <a:extLst>
               <a:ext uri="{91240B29-F687-4f45-9708-019B960494DF}">
-                <a14:hiddenLine xmlns="" xmlns:a14="http://schemas.microsoft.com/office/drawing/2010/main" w="9525">
+                <a14:hiddenLine xmlns:a14="http://schemas.microsoft.com/office/drawing/2010/main" xmlns="" w="9525">
                   <a:solidFill>
                     <a:srgbClr val="000000"/>
                   </a:solidFill>
@@ -1289,7 +1292,7 @@
             </a:ln>
             <a:extLst>
               <a:ext uri="{91240B29-F687-4f45-9708-019B960494DF}">
-                <a14:hiddenLine xmlns="" xmlns:a14="http://schemas.microsoft.com/office/drawing/2010/main" w="9525">
+                <a14:hiddenLine xmlns:a14="http://schemas.microsoft.com/office/drawing/2010/main" xmlns="" w="9525">
                   <a:solidFill>
                     <a:srgbClr val="000000"/>
                   </a:solidFill>
@@ -1379,7 +1382,7 @@
             </a:ln>
             <a:extLst>
               <a:ext uri="{91240B29-F687-4f45-9708-019B960494DF}">
-                <a14:hiddenLine xmlns="" xmlns:a14="http://schemas.microsoft.com/office/drawing/2010/main" w="9525">
+                <a14:hiddenLine xmlns:a14="http://schemas.microsoft.com/office/drawing/2010/main" xmlns="" w="9525">
                   <a:solidFill>
                     <a:srgbClr val="000000"/>
                   </a:solidFill>
@@ -1469,7 +1472,7 @@
             </a:ln>
             <a:extLst>
               <a:ext uri="{91240B29-F687-4f45-9708-019B960494DF}">
-                <a14:hiddenLine xmlns="" xmlns:a14="http://schemas.microsoft.com/office/drawing/2010/main" w="9525">
+                <a14:hiddenLine xmlns:a14="http://schemas.microsoft.com/office/drawing/2010/main" xmlns="" w="9525">
                   <a:solidFill>
                     <a:srgbClr val="000000"/>
                   </a:solidFill>
@@ -1531,7 +1534,7 @@
             </a:ln>
             <a:extLst>
               <a:ext uri="{91240B29-F687-4f45-9708-019B960494DF}">
-                <a14:hiddenLine xmlns="" xmlns:a14="http://schemas.microsoft.com/office/drawing/2010/main" w="9525">
+                <a14:hiddenLine xmlns:a14="http://schemas.microsoft.com/office/drawing/2010/main" xmlns="" w="9525">
                   <a:solidFill>
                     <a:srgbClr val="000000"/>
                   </a:solidFill>
@@ -1621,7 +1624,7 @@
             </a:ln>
             <a:extLst>
               <a:ext uri="{91240B29-F687-4f45-9708-019B960494DF}">
-                <a14:hiddenLine xmlns="" xmlns:a14="http://schemas.microsoft.com/office/drawing/2010/main" w="9525">
+                <a14:hiddenLine xmlns:a14="http://schemas.microsoft.com/office/drawing/2010/main" xmlns="" w="9525">
                   <a:solidFill>
                     <a:srgbClr val="000000"/>
                   </a:solidFill>
@@ -1711,7 +1714,7 @@
             </a:ln>
             <a:extLst>
               <a:ext uri="{91240B29-F687-4f45-9708-019B960494DF}">
-                <a14:hiddenLine xmlns="" xmlns:a14="http://schemas.microsoft.com/office/drawing/2010/main" w="9525">
+                <a14:hiddenLine xmlns:a14="http://schemas.microsoft.com/office/drawing/2010/main" xmlns="" w="9525">
                   <a:solidFill>
                     <a:srgbClr val="000000"/>
                   </a:solidFill>
@@ -1767,7 +1770,7 @@
             </a:ln>
             <a:extLst>
               <a:ext uri="{91240B29-F687-4f45-9708-019B960494DF}">
-                <a14:hiddenLine xmlns="" xmlns:a14="http://schemas.microsoft.com/office/drawing/2010/main" w="9525">
+                <a14:hiddenLine xmlns:a14="http://schemas.microsoft.com/office/drawing/2010/main" xmlns="" w="9525">
                   <a:solidFill>
                     <a:srgbClr val="000000"/>
                   </a:solidFill>
@@ -1857,7 +1860,7 @@
             </a:ln>
             <a:extLst>
               <a:ext uri="{91240B29-F687-4f45-9708-019B960494DF}">
-                <a14:hiddenLine xmlns="" xmlns:a14="http://schemas.microsoft.com/office/drawing/2010/main" w="9525">
+                <a14:hiddenLine xmlns:a14="http://schemas.microsoft.com/office/drawing/2010/main" xmlns="" w="9525">
                   <a:solidFill>
                     <a:srgbClr val="000000"/>
                   </a:solidFill>
@@ -1913,7 +1916,7 @@
             </a:ln>
             <a:extLst>
               <a:ext uri="{91240B29-F687-4f45-9708-019B960494DF}">
-                <a14:hiddenLine xmlns="" xmlns:a14="http://schemas.microsoft.com/office/drawing/2010/main" w="9525">
+                <a14:hiddenLine xmlns:a14="http://schemas.microsoft.com/office/drawing/2010/main" xmlns="" w="9525">
                   <a:solidFill>
                     <a:srgbClr val="000000"/>
                   </a:solidFill>
@@ -2003,7 +2006,7 @@
             </a:ln>
             <a:extLst>
               <a:ext uri="{91240B29-F687-4f45-9708-019B960494DF}">
-                <a14:hiddenLine xmlns="" xmlns:a14="http://schemas.microsoft.com/office/drawing/2010/main" w="9525">
+                <a14:hiddenLine xmlns:a14="http://schemas.microsoft.com/office/drawing/2010/main" xmlns="" w="9525">
                   <a:solidFill>
                     <a:srgbClr val="000000"/>
                   </a:solidFill>
@@ -2071,7 +2074,7 @@
             </a:ln>
             <a:extLst>
               <a:ext uri="{91240B29-F687-4f45-9708-019B960494DF}">
-                <a14:hiddenLine xmlns="" xmlns:a14="http://schemas.microsoft.com/office/drawing/2010/main" w="9525">
+                <a14:hiddenLine xmlns:a14="http://schemas.microsoft.com/office/drawing/2010/main" xmlns="" w="9525">
                   <a:solidFill>
                     <a:srgbClr val="000000"/>
                   </a:solidFill>
@@ -2161,7 +2164,7 @@
             </a:ln>
             <a:extLst>
               <a:ext uri="{91240B29-F687-4f45-9708-019B960494DF}">
-                <a14:hiddenLine xmlns="" xmlns:a14="http://schemas.microsoft.com/office/drawing/2010/main" w="9525">
+                <a14:hiddenLine xmlns:a14="http://schemas.microsoft.com/office/drawing/2010/main" xmlns="" w="9525">
                   <a:solidFill>
                     <a:srgbClr val="000000"/>
                   </a:solidFill>
@@ -2229,7 +2232,7 @@
             </a:ln>
             <a:extLst>
               <a:ext uri="{91240B29-F687-4f45-9708-019B960494DF}">
-                <a14:hiddenLine xmlns="" xmlns:a14="http://schemas.microsoft.com/office/drawing/2010/main" w="9525">
+                <a14:hiddenLine xmlns:a14="http://schemas.microsoft.com/office/drawing/2010/main" xmlns="" w="9525">
                   <a:solidFill>
                     <a:srgbClr val="000000"/>
                   </a:solidFill>
@@ -2319,7 +2322,7 @@
             </a:ln>
             <a:extLst>
               <a:ext uri="{91240B29-F687-4f45-9708-019B960494DF}">
-                <a14:hiddenLine xmlns="" xmlns:a14="http://schemas.microsoft.com/office/drawing/2010/main" w="9525">
+                <a14:hiddenLine xmlns:a14="http://schemas.microsoft.com/office/drawing/2010/main" xmlns="" w="9525">
                   <a:solidFill>
                     <a:srgbClr val="000000"/>
                   </a:solidFill>
@@ -2353,7 +2356,7 @@
             </a:ln>
             <a:extLst>
               <a:ext uri="{91240B29-F687-4f45-9708-019B960494DF}">
-                <a14:hiddenLine xmlns="" xmlns:a14="http://schemas.microsoft.com/office/drawing/2010/main" w="9525">
+                <a14:hiddenLine xmlns:a14="http://schemas.microsoft.com/office/drawing/2010/main" xmlns="" w="9525">
                   <a:solidFill>
                     <a:srgbClr val="000000"/>
                   </a:solidFill>
@@ -2443,7 +2446,7 @@
             </a:ln>
             <a:extLst>
               <a:ext uri="{91240B29-F687-4f45-9708-019B960494DF}">
-                <a14:hiddenLine xmlns="" xmlns:a14="http://schemas.microsoft.com/office/drawing/2010/main" w="9525">
+                <a14:hiddenLine xmlns:a14="http://schemas.microsoft.com/office/drawing/2010/main" xmlns="" w="9525">
                   <a:solidFill>
                     <a:srgbClr val="000000"/>
                   </a:solidFill>
@@ -2505,7 +2508,7 @@
             </a:ln>
             <a:extLst>
               <a:ext uri="{91240B29-F687-4f45-9708-019B960494DF}">
-                <a14:hiddenLine xmlns="" xmlns:a14="http://schemas.microsoft.com/office/drawing/2010/main" w="9525">
+                <a14:hiddenLine xmlns:a14="http://schemas.microsoft.com/office/drawing/2010/main" xmlns="" w="9525">
                   <a:solidFill>
                     <a:srgbClr val="000000"/>
                   </a:solidFill>
@@ -2567,7 +2570,7 @@
             </a:ln>
             <a:extLst>
               <a:ext uri="{91240B29-F687-4f45-9708-019B960494DF}">
-                <a14:hiddenLine xmlns="" xmlns:a14="http://schemas.microsoft.com/office/drawing/2010/main" w="9525">
+                <a14:hiddenLine xmlns:a14="http://schemas.microsoft.com/office/drawing/2010/main" xmlns="" w="9525">
                   <a:solidFill>
                     <a:srgbClr val="000000"/>
                   </a:solidFill>
@@ -2657,7 +2660,7 @@
             </a:ln>
             <a:extLst>
               <a:ext uri="{91240B29-F687-4f45-9708-019B960494DF}">
-                <a14:hiddenLine xmlns="" xmlns:a14="http://schemas.microsoft.com/office/drawing/2010/main" w="9525">
+                <a14:hiddenLine xmlns:a14="http://schemas.microsoft.com/office/drawing/2010/main" xmlns="" w="9525">
                   <a:solidFill>
                     <a:srgbClr val="000000"/>
                   </a:solidFill>
@@ -2725,7 +2728,7 @@
             </a:ln>
             <a:extLst>
               <a:ext uri="{91240B29-F687-4f45-9708-019B960494DF}">
-                <a14:hiddenLine xmlns="" xmlns:a14="http://schemas.microsoft.com/office/drawing/2010/main" w="9525">
+                <a14:hiddenLine xmlns:a14="http://schemas.microsoft.com/office/drawing/2010/main" xmlns="" w="9525">
                   <a:solidFill>
                     <a:srgbClr val="000000"/>
                   </a:solidFill>
@@ -2787,7 +2790,7 @@
             </a:ln>
             <a:extLst>
               <a:ext uri="{91240B29-F687-4f45-9708-019B960494DF}">
-                <a14:hiddenLine xmlns="" xmlns:a14="http://schemas.microsoft.com/office/drawing/2010/main" w="9525">
+                <a14:hiddenLine xmlns:a14="http://schemas.microsoft.com/office/drawing/2010/main" xmlns="" w="9525">
                   <a:solidFill>
                     <a:srgbClr val="000000"/>
                   </a:solidFill>
@@ -2877,7 +2880,7 @@
             </a:ln>
             <a:extLst>
               <a:ext uri="{91240B29-F687-4f45-9708-019B960494DF}">
-                <a14:hiddenLine xmlns="" xmlns:a14="http://schemas.microsoft.com/office/drawing/2010/main" w="9525">
+                <a14:hiddenLine xmlns:a14="http://schemas.microsoft.com/office/drawing/2010/main" xmlns="" w="9525">
                   <a:solidFill>
                     <a:srgbClr val="000000"/>
                   </a:solidFill>
@@ -2939,7 +2942,7 @@
             </a:ln>
             <a:extLst>
               <a:ext uri="{91240B29-F687-4f45-9708-019B960494DF}">
-                <a14:hiddenLine xmlns="" xmlns:a14="http://schemas.microsoft.com/office/drawing/2010/main" w="9525">
+                <a14:hiddenLine xmlns:a14="http://schemas.microsoft.com/office/drawing/2010/main" xmlns="" w="9525">
                   <a:solidFill>
                     <a:srgbClr val="000000"/>
                   </a:solidFill>
@@ -3029,7 +3032,7 @@
             </a:ln>
             <a:extLst>
               <a:ext uri="{91240B29-F687-4f45-9708-019B960494DF}">
-                <a14:hiddenLine xmlns="" xmlns:a14="http://schemas.microsoft.com/office/drawing/2010/main" w="9525">
+                <a14:hiddenLine xmlns:a14="http://schemas.microsoft.com/office/drawing/2010/main" xmlns="" w="9525">
                   <a:solidFill>
                     <a:srgbClr val="000000"/>
                   </a:solidFill>
@@ -3091,7 +3094,7 @@
             </a:ln>
             <a:extLst>
               <a:ext uri="{91240B29-F687-4f45-9708-019B960494DF}">
-                <a14:hiddenLine xmlns="" xmlns:a14="http://schemas.microsoft.com/office/drawing/2010/main" w="9525">
+                <a14:hiddenLine xmlns:a14="http://schemas.microsoft.com/office/drawing/2010/main" xmlns="" w="9525">
                   <a:solidFill>
                     <a:srgbClr val="000000"/>
                   </a:solidFill>
@@ -3181,7 +3184,7 @@
             </a:ln>
             <a:extLst>
               <a:ext uri="{91240B29-F687-4f45-9708-019B960494DF}">
-                <a14:hiddenLine xmlns="" xmlns:a14="http://schemas.microsoft.com/office/drawing/2010/main" w="9525">
+                <a14:hiddenLine xmlns:a14="http://schemas.microsoft.com/office/drawing/2010/main" xmlns="" w="9525">
                   <a:solidFill>
                     <a:srgbClr val="000000"/>
                   </a:solidFill>
@@ -3215,7 +3218,7 @@
             </a:ln>
             <a:extLst>
               <a:ext uri="{91240B29-F687-4f45-9708-019B960494DF}">
-                <a14:hiddenLine xmlns="" xmlns:a14="http://schemas.microsoft.com/office/drawing/2010/main" w="9525">
+                <a14:hiddenLine xmlns:a14="http://schemas.microsoft.com/office/drawing/2010/main" xmlns="" w="9525">
                   <a:solidFill>
                     <a:srgbClr val="000000"/>
                   </a:solidFill>
@@ -3280,7 +3283,7 @@
             </a:ln>
             <a:extLst>
               <a:ext uri="{91240B29-F687-4f45-9708-019B960494DF}">
-                <a14:hiddenLine xmlns="" xmlns:a14="http://schemas.microsoft.com/office/drawing/2010/main" w="9525">
+                <a14:hiddenLine xmlns:a14="http://schemas.microsoft.com/office/drawing/2010/main" xmlns="" w="9525">
                   <a:solidFill>
                     <a:srgbClr val="000000"/>
                   </a:solidFill>
@@ -3370,7 +3373,7 @@
             </a:ln>
             <a:extLst>
               <a:ext uri="{91240B29-F687-4f45-9708-019B960494DF}">
-                <a14:hiddenLine xmlns="" xmlns:a14="http://schemas.microsoft.com/office/drawing/2010/main" w="9525">
+                <a14:hiddenLine xmlns:a14="http://schemas.microsoft.com/office/drawing/2010/main" xmlns="" w="9525">
                   <a:solidFill>
                     <a:srgbClr val="000000"/>
                   </a:solidFill>
@@ -3432,7 +3435,7 @@
             </a:ln>
             <a:extLst>
               <a:ext uri="{91240B29-F687-4f45-9708-019B960494DF}">
-                <a14:hiddenLine xmlns="" xmlns:a14="http://schemas.microsoft.com/office/drawing/2010/main" w="9525">
+                <a14:hiddenLine xmlns:a14="http://schemas.microsoft.com/office/drawing/2010/main" xmlns="" w="9525">
                   <a:solidFill>
                     <a:srgbClr val="000000"/>
                   </a:solidFill>
@@ -3522,7 +3525,7 @@
             </a:ln>
             <a:extLst>
               <a:ext uri="{91240B29-F687-4f45-9708-019B960494DF}">
-                <a14:hiddenLine xmlns="" xmlns:a14="http://schemas.microsoft.com/office/drawing/2010/main" w="9525">
+                <a14:hiddenLine xmlns:a14="http://schemas.microsoft.com/office/drawing/2010/main" xmlns="" w="9525">
                   <a:solidFill>
                     <a:srgbClr val="000000"/>
                   </a:solidFill>
@@ -3612,7 +3615,7 @@
             </a:ln>
             <a:extLst>
               <a:ext uri="{91240B29-F687-4f45-9708-019B960494DF}">
-                <a14:hiddenLine xmlns="" xmlns:a14="http://schemas.microsoft.com/office/drawing/2010/main" w="9525">
+                <a14:hiddenLine xmlns:a14="http://schemas.microsoft.com/office/drawing/2010/main" xmlns="" w="9525">
                   <a:solidFill>
                     <a:srgbClr val="000000"/>
                   </a:solidFill>
@@ -3677,7 +3680,7 @@
             </a:ln>
             <a:extLst>
               <a:ext uri="{91240B29-F687-4f45-9708-019B960494DF}">
-                <a14:hiddenLine xmlns="" xmlns:a14="http://schemas.microsoft.com/office/drawing/2010/main" w="9525">
+                <a14:hiddenLine xmlns:a14="http://schemas.microsoft.com/office/drawing/2010/main" xmlns="" w="9525">
                   <a:solidFill>
                     <a:srgbClr val="000000"/>
                   </a:solidFill>
@@ -3739,7 +3742,7 @@
             </a:ln>
             <a:extLst>
               <a:ext uri="{91240B29-F687-4f45-9708-019B960494DF}">
-                <a14:hiddenLine xmlns="" xmlns:a14="http://schemas.microsoft.com/office/drawing/2010/main" w="9525">
+                <a14:hiddenLine xmlns:a14="http://schemas.microsoft.com/office/drawing/2010/main" xmlns="" w="9525">
                   <a:solidFill>
                     <a:srgbClr val="000000"/>
                   </a:solidFill>
@@ -3829,7 +3832,7 @@
             </a:ln>
             <a:extLst>
               <a:ext uri="{91240B29-F687-4f45-9708-019B960494DF}">
-                <a14:hiddenLine xmlns="" xmlns:a14="http://schemas.microsoft.com/office/drawing/2010/main" w="9525">
+                <a14:hiddenLine xmlns:a14="http://schemas.microsoft.com/office/drawing/2010/main" xmlns="" w="9525">
                   <a:solidFill>
                     <a:srgbClr val="000000"/>
                   </a:solidFill>
@@ -3919,7 +3922,7 @@
             </a:ln>
             <a:extLst>
               <a:ext uri="{91240B29-F687-4f45-9708-019B960494DF}">
-                <a14:hiddenLine xmlns="" xmlns:a14="http://schemas.microsoft.com/office/drawing/2010/main" w="9525">
+                <a14:hiddenLine xmlns:a14="http://schemas.microsoft.com/office/drawing/2010/main" xmlns="" w="9525">
                   <a:solidFill>
                     <a:srgbClr val="000000"/>
                   </a:solidFill>
@@ -3981,7 +3984,7 @@
             </a:ln>
             <a:extLst>
               <a:ext uri="{91240B29-F687-4f45-9708-019B960494DF}">
-                <a14:hiddenLine xmlns="" xmlns:a14="http://schemas.microsoft.com/office/drawing/2010/main" w="9525">
+                <a14:hiddenLine xmlns:a14="http://schemas.microsoft.com/office/drawing/2010/main" xmlns="" w="9525">
                   <a:solidFill>
                     <a:srgbClr val="000000"/>
                   </a:solidFill>
@@ -4101,7 +4104,7 @@
             </a:ln>
             <a:extLst>
               <a:ext uri="{91240B29-F687-4f45-9708-019B960494DF}">
-                <a14:hiddenLine xmlns="" xmlns:a14="http://schemas.microsoft.com/office/drawing/2010/main" w="9525">
+                <a14:hiddenLine xmlns:a14="http://schemas.microsoft.com/office/drawing/2010/main" xmlns="" w="9525">
                   <a:solidFill>
                     <a:srgbClr val="000000"/>
                   </a:solidFill>
@@ -4169,7 +4172,7 @@
             </a:ln>
             <a:extLst>
               <a:ext uri="{91240B29-F687-4f45-9708-019B960494DF}">
-                <a14:hiddenLine xmlns="" xmlns:a14="http://schemas.microsoft.com/office/drawing/2010/main" w="9525">
+                <a14:hiddenLine xmlns:a14="http://schemas.microsoft.com/office/drawing/2010/main" xmlns="" w="9525">
                   <a:solidFill>
                     <a:srgbClr val="000000"/>
                   </a:solidFill>
@@ -4259,7 +4262,7 @@
             </a:ln>
             <a:extLst>
               <a:ext uri="{91240B29-F687-4f45-9708-019B960494DF}">
-                <a14:hiddenLine xmlns="" xmlns:a14="http://schemas.microsoft.com/office/drawing/2010/main" w="9525">
+                <a14:hiddenLine xmlns:a14="http://schemas.microsoft.com/office/drawing/2010/main" xmlns="" w="9525">
                   <a:solidFill>
                     <a:srgbClr val="000000"/>
                   </a:solidFill>
@@ -9073,7 +9076,7 @@
           <a:noFill/>
           <a:extLst>
             <a:ext uri="{909E8E84-426E-40dd-AFC4-6F175D3DCCD1}">
-              <a14:hiddenFill xmlns="" xmlns:a14="http://schemas.microsoft.com/office/drawing/2010/main">
+              <a14:hiddenFill xmlns:a14="http://schemas.microsoft.com/office/drawing/2010/main" xmlns="">
                 <a:solidFill>
                   <a:srgbClr val="FFFFFF"/>
                 </a:solidFill>
@@ -9147,7 +9150,7 @@
               </a:ln>
               <a:extLst>
                 <a:ext uri="{91240B29-F687-4f45-9708-019B960494DF}">
-                  <a14:hiddenLine xmlns="" xmlns:a14="http://schemas.microsoft.com/office/drawing/2010/main" w="9525">
+                  <a14:hiddenLine xmlns:a14="http://schemas.microsoft.com/office/drawing/2010/main" xmlns="" w="9525">
                     <a:solidFill>
                       <a:srgbClr val="000000"/>
                     </a:solidFill>
@@ -9237,7 +9240,7 @@
               </a:ln>
               <a:extLst>
                 <a:ext uri="{91240B29-F687-4f45-9708-019B960494DF}">
-                  <a14:hiddenLine xmlns="" xmlns:a14="http://schemas.microsoft.com/office/drawing/2010/main" w="9525">
+                  <a14:hiddenLine xmlns:a14="http://schemas.microsoft.com/office/drawing/2010/main" xmlns="" w="9525">
                     <a:solidFill>
                       <a:srgbClr val="000000"/>
                     </a:solidFill>
@@ -9327,7 +9330,7 @@
               </a:ln>
               <a:extLst>
                 <a:ext uri="{91240B29-F687-4f45-9708-019B960494DF}">
-                  <a14:hiddenLine xmlns="" xmlns:a14="http://schemas.microsoft.com/office/drawing/2010/main" w="9525">
+                  <a14:hiddenLine xmlns:a14="http://schemas.microsoft.com/office/drawing/2010/main" xmlns="" w="9525">
                     <a:solidFill>
                       <a:srgbClr val="000000"/>
                     </a:solidFill>
@@ -9389,7 +9392,7 @@
               </a:ln>
               <a:extLst>
                 <a:ext uri="{91240B29-F687-4f45-9708-019B960494DF}">
-                  <a14:hiddenLine xmlns="" xmlns:a14="http://schemas.microsoft.com/office/drawing/2010/main" w="9525">
+                  <a14:hiddenLine xmlns:a14="http://schemas.microsoft.com/office/drawing/2010/main" xmlns="" w="9525">
                     <a:solidFill>
                       <a:srgbClr val="000000"/>
                     </a:solidFill>
@@ -9479,7 +9482,7 @@
               </a:ln>
               <a:extLst>
                 <a:ext uri="{91240B29-F687-4f45-9708-019B960494DF}">
-                  <a14:hiddenLine xmlns="" xmlns:a14="http://schemas.microsoft.com/office/drawing/2010/main" w="9525">
+                  <a14:hiddenLine xmlns:a14="http://schemas.microsoft.com/office/drawing/2010/main" xmlns="" w="9525">
                     <a:solidFill>
                       <a:srgbClr val="000000"/>
                     </a:solidFill>
@@ -9541,7 +9544,7 @@
               </a:ln>
               <a:extLst>
                 <a:ext uri="{91240B29-F687-4f45-9708-019B960494DF}">
-                  <a14:hiddenLine xmlns="" xmlns:a14="http://schemas.microsoft.com/office/drawing/2010/main" w="9525">
+                  <a14:hiddenLine xmlns:a14="http://schemas.microsoft.com/office/drawing/2010/main" xmlns="" w="9525">
                     <a:solidFill>
                       <a:srgbClr val="000000"/>
                     </a:solidFill>
@@ -9603,7 +9606,7 @@
               </a:ln>
               <a:extLst>
                 <a:ext uri="{91240B29-F687-4f45-9708-019B960494DF}">
-                  <a14:hiddenLine xmlns="" xmlns:a14="http://schemas.microsoft.com/office/drawing/2010/main" w="9525">
+                  <a14:hiddenLine xmlns:a14="http://schemas.microsoft.com/office/drawing/2010/main" xmlns="" w="9525">
                     <a:solidFill>
                       <a:srgbClr val="000000"/>
                     </a:solidFill>
@@ -9693,7 +9696,7 @@
               </a:ln>
               <a:extLst>
                 <a:ext uri="{91240B29-F687-4f45-9708-019B960494DF}">
-                  <a14:hiddenLine xmlns="" xmlns:a14="http://schemas.microsoft.com/office/drawing/2010/main" w="9525">
+                  <a14:hiddenLine xmlns:a14="http://schemas.microsoft.com/office/drawing/2010/main" xmlns="" w="9525">
                     <a:solidFill>
                       <a:srgbClr val="000000"/>
                     </a:solidFill>
@@ -9783,7 +9786,7 @@
               </a:ln>
               <a:extLst>
                 <a:ext uri="{91240B29-F687-4f45-9708-019B960494DF}">
-                  <a14:hiddenLine xmlns="" xmlns:a14="http://schemas.microsoft.com/office/drawing/2010/main" w="9525">
+                  <a14:hiddenLine xmlns:a14="http://schemas.microsoft.com/office/drawing/2010/main" xmlns="" w="9525">
                     <a:solidFill>
                       <a:srgbClr val="000000"/>
                     </a:solidFill>
@@ -9845,7 +9848,7 @@
               </a:ln>
               <a:extLst>
                 <a:ext uri="{91240B29-F687-4f45-9708-019B960494DF}">
-                  <a14:hiddenLine xmlns="" xmlns:a14="http://schemas.microsoft.com/office/drawing/2010/main" w="9525">
+                  <a14:hiddenLine xmlns:a14="http://schemas.microsoft.com/office/drawing/2010/main" xmlns="" w="9525">
                     <a:solidFill>
                       <a:srgbClr val="000000"/>
                     </a:solidFill>
@@ -9955,7 +9958,7 @@
               </a:ln>
               <a:extLst>
                 <a:ext uri="{91240B29-F687-4f45-9708-019B960494DF}">
-                  <a14:hiddenLine xmlns="" xmlns:a14="http://schemas.microsoft.com/office/drawing/2010/main" w="9525">
+                  <a14:hiddenLine xmlns:a14="http://schemas.microsoft.com/office/drawing/2010/main" xmlns="" w="9525">
                     <a:solidFill>
                       <a:srgbClr val="000000"/>
                     </a:solidFill>
@@ -10039,7 +10042,7 @@
               </a:ln>
               <a:extLst>
                 <a:ext uri="{91240B29-F687-4f45-9708-019B960494DF}">
-                  <a14:hiddenLine xmlns="" xmlns:a14="http://schemas.microsoft.com/office/drawing/2010/main" w="9525">
+                  <a14:hiddenLine xmlns:a14="http://schemas.microsoft.com/office/drawing/2010/main" xmlns="" w="9525">
                     <a:solidFill>
                       <a:srgbClr val="000000"/>
                     </a:solidFill>
@@ -10101,7 +10104,7 @@
               </a:ln>
               <a:extLst>
                 <a:ext uri="{91240B29-F687-4f45-9708-019B960494DF}">
-                  <a14:hiddenLine xmlns="" xmlns:a14="http://schemas.microsoft.com/office/drawing/2010/main" w="9525">
+                  <a14:hiddenLine xmlns:a14="http://schemas.microsoft.com/office/drawing/2010/main" xmlns="" w="9525">
                     <a:solidFill>
                       <a:srgbClr val="000000"/>
                     </a:solidFill>
@@ -10163,7 +10166,7 @@
               </a:ln>
               <a:extLst>
                 <a:ext uri="{91240B29-F687-4f45-9708-019B960494DF}">
-                  <a14:hiddenLine xmlns="" xmlns:a14="http://schemas.microsoft.com/office/drawing/2010/main" w="9525">
+                  <a14:hiddenLine xmlns:a14="http://schemas.microsoft.com/office/drawing/2010/main" xmlns="" w="9525">
                     <a:solidFill>
                       <a:srgbClr val="000000"/>
                     </a:solidFill>
@@ -10253,7 +10256,7 @@
               </a:ln>
               <a:extLst>
                 <a:ext uri="{91240B29-F687-4f45-9708-019B960494DF}">
-                  <a14:hiddenLine xmlns="" xmlns:a14="http://schemas.microsoft.com/office/drawing/2010/main" w="9525">
+                  <a14:hiddenLine xmlns:a14="http://schemas.microsoft.com/office/drawing/2010/main" xmlns="" w="9525">
                     <a:solidFill>
                       <a:srgbClr val="000000"/>
                     </a:solidFill>
@@ -10287,7 +10290,7 @@
               </a:ln>
               <a:extLst>
                 <a:ext uri="{91240B29-F687-4f45-9708-019B960494DF}">
-                  <a14:hiddenLine xmlns="" xmlns:a14="http://schemas.microsoft.com/office/drawing/2010/main" w="9525">
+                  <a14:hiddenLine xmlns:a14="http://schemas.microsoft.com/office/drawing/2010/main" xmlns="" w="9525">
                     <a:solidFill>
                       <a:srgbClr val="000000"/>
                     </a:solidFill>
@@ -10352,7 +10355,7 @@
               </a:ln>
               <a:extLst>
                 <a:ext uri="{91240B29-F687-4f45-9708-019B960494DF}">
-                  <a14:hiddenLine xmlns="" xmlns:a14="http://schemas.microsoft.com/office/drawing/2010/main" w="9525">
+                  <a14:hiddenLine xmlns:a14="http://schemas.microsoft.com/office/drawing/2010/main" xmlns="" w="9525">
                     <a:solidFill>
                       <a:srgbClr val="000000"/>
                     </a:solidFill>
@@ -10442,7 +10445,7 @@
               </a:ln>
               <a:extLst>
                 <a:ext uri="{91240B29-F687-4f45-9708-019B960494DF}">
-                  <a14:hiddenLine xmlns="" xmlns:a14="http://schemas.microsoft.com/office/drawing/2010/main" w="9525">
+                  <a14:hiddenLine xmlns:a14="http://schemas.microsoft.com/office/drawing/2010/main" xmlns="" w="9525">
                     <a:solidFill>
                       <a:srgbClr val="000000"/>
                     </a:solidFill>
@@ -10504,7 +10507,7 @@
               </a:ln>
               <a:extLst>
                 <a:ext uri="{91240B29-F687-4f45-9708-019B960494DF}">
-                  <a14:hiddenLine xmlns="" xmlns:a14="http://schemas.microsoft.com/office/drawing/2010/main" w="9525">
+                  <a14:hiddenLine xmlns:a14="http://schemas.microsoft.com/office/drawing/2010/main" xmlns="" w="9525">
                     <a:solidFill>
                       <a:srgbClr val="000000"/>
                     </a:solidFill>
@@ -10594,7 +10597,7 @@
               </a:ln>
               <a:extLst>
                 <a:ext uri="{91240B29-F687-4f45-9708-019B960494DF}">
-                  <a14:hiddenLine xmlns="" xmlns:a14="http://schemas.microsoft.com/office/drawing/2010/main" w="9525">
+                  <a14:hiddenLine xmlns:a14="http://schemas.microsoft.com/office/drawing/2010/main" xmlns="" w="9525">
                     <a:solidFill>
                       <a:srgbClr val="000000"/>
                     </a:solidFill>
@@ -10659,7 +10662,7 @@
               </a:ln>
               <a:extLst>
                 <a:ext uri="{91240B29-F687-4f45-9708-019B960494DF}">
-                  <a14:hiddenLine xmlns="" xmlns:a14="http://schemas.microsoft.com/office/drawing/2010/main" w="9525">
+                  <a14:hiddenLine xmlns:a14="http://schemas.microsoft.com/office/drawing/2010/main" xmlns="" w="9525">
                     <a:solidFill>
                       <a:srgbClr val="000000"/>
                     </a:solidFill>
@@ -10721,7 +10724,7 @@
               </a:ln>
               <a:extLst>
                 <a:ext uri="{91240B29-F687-4f45-9708-019B960494DF}">
-                  <a14:hiddenLine xmlns="" xmlns:a14="http://schemas.microsoft.com/office/drawing/2010/main" w="9525">
+                  <a14:hiddenLine xmlns:a14="http://schemas.microsoft.com/office/drawing/2010/main" xmlns="" w="9525">
                     <a:solidFill>
                       <a:srgbClr val="000000"/>
                     </a:solidFill>
@@ -10811,7 +10814,7 @@
               </a:ln>
               <a:extLst>
                 <a:ext uri="{91240B29-F687-4f45-9708-019B960494DF}">
-                  <a14:hiddenLine xmlns="" xmlns:a14="http://schemas.microsoft.com/office/drawing/2010/main" w="9525">
+                  <a14:hiddenLine xmlns:a14="http://schemas.microsoft.com/office/drawing/2010/main" xmlns="" w="9525">
                     <a:solidFill>
                       <a:srgbClr val="000000"/>
                     </a:solidFill>
@@ -10901,7 +10904,7 @@
               </a:ln>
               <a:extLst>
                 <a:ext uri="{91240B29-F687-4f45-9708-019B960494DF}">
-                  <a14:hiddenLine xmlns="" xmlns:a14="http://schemas.microsoft.com/office/drawing/2010/main" w="9525">
+                  <a14:hiddenLine xmlns:a14="http://schemas.microsoft.com/office/drawing/2010/main" xmlns="" w="9525">
                     <a:solidFill>
                       <a:srgbClr val="000000"/>
                     </a:solidFill>
@@ -10966,7 +10969,7 @@
               </a:ln>
               <a:extLst>
                 <a:ext uri="{91240B29-F687-4f45-9708-019B960494DF}">
-                  <a14:hiddenLine xmlns="" xmlns:a14="http://schemas.microsoft.com/office/drawing/2010/main" w="9525">
+                  <a14:hiddenLine xmlns:a14="http://schemas.microsoft.com/office/drawing/2010/main" xmlns="" w="9525">
                     <a:solidFill>
                       <a:srgbClr val="000000"/>
                     </a:solidFill>
@@ -11086,7 +11089,7 @@
               </a:ln>
               <a:extLst>
                 <a:ext uri="{91240B29-F687-4f45-9708-019B960494DF}">
-                  <a14:hiddenLine xmlns="" xmlns:a14="http://schemas.microsoft.com/office/drawing/2010/main" w="9525">
+                  <a14:hiddenLine xmlns:a14="http://schemas.microsoft.com/office/drawing/2010/main" xmlns="" w="9525">
                     <a:solidFill>
                       <a:srgbClr val="000000"/>
                     </a:solidFill>
@@ -11184,7 +11187,7 @@
               </a:ln>
               <a:extLst>
                 <a:ext uri="{91240B29-F687-4f45-9708-019B960494DF}">
-                  <a14:hiddenLine xmlns="" xmlns:a14="http://schemas.microsoft.com/office/drawing/2010/main" w="9525">
+                  <a14:hiddenLine xmlns:a14="http://schemas.microsoft.com/office/drawing/2010/main" xmlns="" w="9525">
                     <a:solidFill>
                       <a:srgbClr val="000000"/>
                     </a:solidFill>
@@ -11299,7 +11302,7 @@
               </a:ln>
               <a:extLst>
                 <a:ext uri="{91240B29-F687-4f45-9708-019B960494DF}">
-                  <a14:hiddenLine xmlns="" xmlns:a14="http://schemas.microsoft.com/office/drawing/2010/main" w="9525">
+                  <a14:hiddenLine xmlns:a14="http://schemas.microsoft.com/office/drawing/2010/main" xmlns="" w="9525">
                     <a:solidFill>
                       <a:srgbClr val="000000"/>
                     </a:solidFill>
@@ -11389,7 +11392,7 @@
               </a:ln>
               <a:extLst>
                 <a:ext uri="{91240B29-F687-4f45-9708-019B960494DF}">
-                  <a14:hiddenLine xmlns="" xmlns:a14="http://schemas.microsoft.com/office/drawing/2010/main" w="9525">
+                  <a14:hiddenLine xmlns:a14="http://schemas.microsoft.com/office/drawing/2010/main" xmlns="" w="9525">
                     <a:solidFill>
                       <a:srgbClr val="000000"/>
                     </a:solidFill>
@@ -11454,7 +11457,7 @@
               </a:ln>
               <a:extLst>
                 <a:ext uri="{91240B29-F687-4f45-9708-019B960494DF}">
-                  <a14:hiddenLine xmlns="" xmlns:a14="http://schemas.microsoft.com/office/drawing/2010/main" w="9525">
+                  <a14:hiddenLine xmlns:a14="http://schemas.microsoft.com/office/drawing/2010/main" xmlns="" w="9525">
                     <a:solidFill>
                       <a:srgbClr val="000000"/>
                     </a:solidFill>
@@ -11544,7 +11547,7 @@
               </a:ln>
               <a:extLst>
                 <a:ext uri="{91240B29-F687-4f45-9708-019B960494DF}">
-                  <a14:hiddenLine xmlns="" xmlns:a14="http://schemas.microsoft.com/office/drawing/2010/main" w="9525">
+                  <a14:hiddenLine xmlns:a14="http://schemas.microsoft.com/office/drawing/2010/main" xmlns="" w="9525">
                     <a:solidFill>
                       <a:srgbClr val="000000"/>
                     </a:solidFill>
@@ -11612,7 +11615,7 @@
               </a:ln>
               <a:extLst>
                 <a:ext uri="{91240B29-F687-4f45-9708-019B960494DF}">
-                  <a14:hiddenLine xmlns="" xmlns:a14="http://schemas.microsoft.com/office/drawing/2010/main" w="9525">
+                  <a14:hiddenLine xmlns:a14="http://schemas.microsoft.com/office/drawing/2010/main" xmlns="" w="9525">
                     <a:solidFill>
                       <a:srgbClr val="000000"/>
                     </a:solidFill>
@@ -11702,7 +11705,7 @@
               </a:ln>
               <a:extLst>
                 <a:ext uri="{91240B29-F687-4f45-9708-019B960494DF}">
-                  <a14:hiddenLine xmlns="" xmlns:a14="http://schemas.microsoft.com/office/drawing/2010/main" w="9525">
+                  <a14:hiddenLine xmlns:a14="http://schemas.microsoft.com/office/drawing/2010/main" xmlns="" w="9525">
                     <a:solidFill>
                       <a:srgbClr val="000000"/>
                     </a:solidFill>
@@ -11770,7 +11773,7 @@
               </a:ln>
               <a:extLst>
                 <a:ext uri="{91240B29-F687-4f45-9708-019B960494DF}">
-                  <a14:hiddenLine xmlns="" xmlns:a14="http://schemas.microsoft.com/office/drawing/2010/main" w="9525">
+                  <a14:hiddenLine xmlns:a14="http://schemas.microsoft.com/office/drawing/2010/main" xmlns="" w="9525">
                     <a:solidFill>
                       <a:srgbClr val="000000"/>
                     </a:solidFill>
@@ -11860,7 +11863,7 @@
               </a:ln>
               <a:extLst>
                 <a:ext uri="{91240B29-F687-4f45-9708-019B960494DF}">
-                  <a14:hiddenLine xmlns="" xmlns:a14="http://schemas.microsoft.com/office/drawing/2010/main" w="9525">
+                  <a14:hiddenLine xmlns:a14="http://schemas.microsoft.com/office/drawing/2010/main" xmlns="" w="9525">
                     <a:solidFill>
                       <a:srgbClr val="000000"/>
                     </a:solidFill>
@@ -11894,7 +11897,7 @@
               </a:ln>
               <a:extLst>
                 <a:ext uri="{91240B29-F687-4f45-9708-019B960494DF}">
-                  <a14:hiddenLine xmlns="" xmlns:a14="http://schemas.microsoft.com/office/drawing/2010/main" w="9525">
+                  <a14:hiddenLine xmlns:a14="http://schemas.microsoft.com/office/drawing/2010/main" xmlns="" w="9525">
                     <a:solidFill>
                       <a:srgbClr val="000000"/>
                     </a:solidFill>
@@ -12503,7 +12506,7 @@
           <p:cNvPr id="2" name="Title 1">
             <a:extLst>
               <a:ext uri="{FF2B5EF4-FFF2-40B4-BE49-F238E27FC236}">
-                <a16:creationId xmlns:a16="http://schemas.microsoft.com/office/drawing/2014/main" id="{86863DF0-671A-9240-A016-43251C5F0FC6}"/>
+                <a16:creationId xmlns:a16="http://schemas.microsoft.com/office/drawing/2014/main" xmlns="" id="{86863DF0-671A-9240-A016-43251C5F0FC6}"/>
               </a:ext>
             </a:extLst>
           </p:cNvPr>
@@ -12531,7 +12534,7 @@
           <p:cNvPr id="3" name="Subtitle 2">
             <a:extLst>
               <a:ext uri="{FF2B5EF4-FFF2-40B4-BE49-F238E27FC236}">
-                <a16:creationId xmlns:a16="http://schemas.microsoft.com/office/drawing/2014/main" id="{0A7B9D25-EBBE-F844-9210-9A3D6D0E0638}"/>
+                <a16:creationId xmlns:a16="http://schemas.microsoft.com/office/drawing/2014/main" xmlns="" id="{0A7B9D25-EBBE-F844-9210-9A3D6D0E0638}"/>
               </a:ext>
             </a:extLst>
           </p:cNvPr>
@@ -12601,6 +12604,13 @@
   <p:clrMapOvr>
     <a:masterClrMapping/>
   </p:clrMapOvr>
+  <p:timing>
+    <p:tnLst>
+      <p:par>
+        <p:cTn id="1" dur="indefinite" restart="never" nodeType="tmRoot"/>
+      </p:par>
+    </p:tnLst>
+  </p:timing>
 </p:sld>
 </file>
 
@@ -12626,7 +12636,7 @@
           <p:cNvPr id="2" name="Title 1">
             <a:extLst>
               <a:ext uri="{FF2B5EF4-FFF2-40B4-BE49-F238E27FC236}">
-                <a16:creationId xmlns:a16="http://schemas.microsoft.com/office/drawing/2014/main" id="{2DA77ECA-A09A-C644-A35B-4F2D59675052}"/>
+                <a16:creationId xmlns:a16="http://schemas.microsoft.com/office/drawing/2014/main" xmlns="" id="{2DA77ECA-A09A-C644-A35B-4F2D59675052}"/>
               </a:ext>
             </a:extLst>
           </p:cNvPr>
@@ -12654,7 +12664,7 @@
           <p:cNvPr id="3" name="Content Placeholder 2">
             <a:extLst>
               <a:ext uri="{FF2B5EF4-FFF2-40B4-BE49-F238E27FC236}">
-                <a16:creationId xmlns:a16="http://schemas.microsoft.com/office/drawing/2014/main" id="{F6D38825-335A-A54B-A6C4-39E39EB602F7}"/>
+                <a16:creationId xmlns:a16="http://schemas.microsoft.com/office/drawing/2014/main" xmlns="" id="{F6D38825-335A-A54B-A6C4-39E39EB602F7}"/>
               </a:ext>
             </a:extLst>
           </p:cNvPr>
@@ -12729,6 +12739,13 @@
   <p:clrMapOvr>
     <a:masterClrMapping/>
   </p:clrMapOvr>
+  <p:timing>
+    <p:tnLst>
+      <p:par>
+        <p:cTn id="1" dur="indefinite" restart="never" nodeType="tmRoot"/>
+      </p:par>
+    </p:tnLst>
+  </p:timing>
 </p:sld>
 </file>
 
@@ -12751,13 +12768,7 @@
       </p:grpSpPr>
       <p:sp>
         <p:nvSpPr>
-          <p:cNvPr id="6" name="Title 5">
-            <a:extLst>
-              <a:ext uri="{FF2B5EF4-FFF2-40B4-BE49-F238E27FC236}">
-                <a16:creationId xmlns:a16="http://schemas.microsoft.com/office/drawing/2014/main" id="{C344DB87-1E25-3F4A-9AE4-223E3AD9988A}"/>
-              </a:ext>
-            </a:extLst>
-          </p:cNvPr>
+          <p:cNvPr id="2" name="Title 1"/>
           <p:cNvSpPr>
             <a:spLocks noGrp="1"/>
           </p:cNvSpPr>
@@ -12767,48 +12778,97 @@
         </p:nvSpPr>
         <p:spPr/>
         <p:txBody>
-          <a:bodyPr>
-            <a:normAutofit/>
-          </a:bodyPr>
+          <a:bodyPr/>
           <a:lstStyle/>
           <a:p>
-            <a:pPr algn="ctr"/>
-            <a:r>
-              <a:rPr lang="en-US" sz="11500" dirty="0"/>
-              <a:t>Demo</a:t>
-            </a:r>
+            <a:endParaRPr lang="en-US" dirty="0"/>
           </a:p>
         </p:txBody>
       </p:sp>
-      <p:sp>
-        <p:nvSpPr>
-          <p:cNvPr id="7" name="Text Placeholder 6">
+      <p:pic>
+        <p:nvPicPr>
+          <p:cNvPr id="4" name="Content Placeholder 3"/>
+          <p:cNvPicPr>
+            <a:picLocks noGrp="1" noChangeAspect="1"/>
+          </p:cNvPicPr>
+          <p:nvPr>
+            <p:ph idx="1"/>
+          </p:nvPr>
+        </p:nvPicPr>
+        <p:blipFill>
+          <a:blip r:embed="rId2">
             <a:extLst>
-              <a:ext uri="{FF2B5EF4-FFF2-40B4-BE49-F238E27FC236}">
-                <a16:creationId xmlns:a16="http://schemas.microsoft.com/office/drawing/2014/main" id="{7A2CFB5C-3BDA-7046-8407-E7E7526AA0C6}"/>
+              <a:ext uri="{28A0092B-C50C-407E-A947-70E740481C1C}">
+                <a14:useLocalDpi xmlns:a14="http://schemas.microsoft.com/office/drawing/2010/main" val="0"/>
               </a:ext>
             </a:extLst>
-          </p:cNvPr>
-          <p:cNvSpPr>
-            <a:spLocks noGrp="1"/>
-          </p:cNvSpPr>
-          <p:nvPr>
-            <p:ph type="body" idx="1"/>
-          </p:nvPr>
-        </p:nvSpPr>
-        <p:spPr/>
-        <p:txBody>
-          <a:bodyPr/>
-          <a:lstStyle/>
-          <a:p>
-            <a:endParaRPr lang="en-US"/>
-          </a:p>
-        </p:txBody>
-      </p:sp>
+          </a:blip>
+          <a:stretch>
+            <a:fillRect/>
+          </a:stretch>
+        </p:blipFill>
+        <p:spPr>
+          <a:xfrm>
+            <a:off x="4189907" y="2249488"/>
+            <a:ext cx="3809011" cy="3541712"/>
+          </a:xfrm>
+        </p:spPr>
+      </p:pic>
+      <p:pic>
+        <p:nvPicPr>
+          <p:cNvPr id="1026" name="Picture 2" descr="mage result for origins logo"/>
+          <p:cNvPicPr>
+            <a:picLocks noChangeAspect="1" noChangeArrowheads="1"/>
+          </p:cNvPicPr>
+          <p:nvPr/>
+        </p:nvPicPr>
+        <p:blipFill>
+          <a:blip r:embed="rId3">
+            <a:clrChange>
+              <a:clrFrom>
+                <a:srgbClr val="FFFFFF"/>
+              </a:clrFrom>
+              <a:clrTo>
+                <a:srgbClr val="FFFFFF">
+                  <a:alpha val="0"/>
+                </a:srgbClr>
+              </a:clrTo>
+            </a:clrChange>
+            <a:extLst>
+              <a:ext uri="{28A0092B-C50C-407E-A947-70E740481C1C}">
+                <a14:useLocalDpi xmlns:a14="http://schemas.microsoft.com/office/drawing/2010/main" val="0"/>
+              </a:ext>
+            </a:extLst>
+          </a:blip>
+          <a:srcRect/>
+          <a:stretch>
+            <a:fillRect/>
+          </a:stretch>
+        </p:blipFill>
+        <p:spPr bwMode="auto">
+          <a:xfrm>
+            <a:off x="5408646" y="672038"/>
+            <a:ext cx="1371530" cy="1371530"/>
+          </a:xfrm>
+          <a:prstGeom prst="rect">
+            <a:avLst/>
+          </a:prstGeom>
+          <a:noFill/>
+          <a:extLst>
+            <a:ext uri="{909E8E84-426E-40DD-AFC4-6F175D3DCCD1}">
+              <a14:hiddenFill xmlns:a14="http://schemas.microsoft.com/office/drawing/2010/main">
+                <a:solidFill>
+                  <a:srgbClr val="FFFFFF"/>
+                </a:solidFill>
+              </a14:hiddenFill>
+            </a:ext>
+          </a:extLst>
+        </p:spPr>
+      </p:pic>
     </p:spTree>
     <p:extLst>
       <p:ext uri="{BB962C8B-B14F-4D97-AF65-F5344CB8AC3E}">
-        <p14:creationId xmlns:p14="http://schemas.microsoft.com/office/powerpoint/2010/main" val="3273662769"/>
+        <p14:creationId xmlns:p14="http://schemas.microsoft.com/office/powerpoint/2010/main" val="980460414"/>
       </p:ext>
     </p:extLst>
   </p:cSld>
@@ -12837,13 +12897,7 @@
       </p:grpSpPr>
       <p:sp>
         <p:nvSpPr>
-          <p:cNvPr id="2" name="Title 1">
-            <a:extLst>
-              <a:ext uri="{FF2B5EF4-FFF2-40B4-BE49-F238E27FC236}">
-                <a16:creationId xmlns:a16="http://schemas.microsoft.com/office/drawing/2014/main" id="{9F7BCB68-720A-FE40-A6CE-92BF7EB86EBB}"/>
-              </a:ext>
-            </a:extLst>
-          </p:cNvPr>
+          <p:cNvPr id="2" name="Title 1"/>
           <p:cNvSpPr>
             <a:spLocks noGrp="1"/>
           </p:cNvSpPr>
@@ -12856,54 +12910,43 @@
           <a:bodyPr/>
           <a:lstStyle/>
           <a:p>
-            <a:r>
-              <a:rPr lang="en-US" dirty="0"/>
-              <a:t>Applications</a:t>
-            </a:r>
+            <a:endParaRPr lang="en-US"/>
           </a:p>
         </p:txBody>
       </p:sp>
-      <p:sp>
-        <p:nvSpPr>
-          <p:cNvPr id="3" name="Content Placeholder 2">
-            <a:extLst>
-              <a:ext uri="{FF2B5EF4-FFF2-40B4-BE49-F238E27FC236}">
-                <a16:creationId xmlns:a16="http://schemas.microsoft.com/office/drawing/2014/main" id="{EBF91E89-3581-264C-9C09-7D2224503937}"/>
-              </a:ext>
-            </a:extLst>
-          </p:cNvPr>
-          <p:cNvSpPr>
-            <a:spLocks noGrp="1"/>
-          </p:cNvSpPr>
+      <p:pic>
+        <p:nvPicPr>
+          <p:cNvPr id="11" name="Content Placeholder 10"/>
+          <p:cNvPicPr>
+            <a:picLocks noGrp="1" noChangeAspect="1"/>
+          </p:cNvPicPr>
           <p:nvPr>
             <p:ph idx="1"/>
           </p:nvPr>
-        </p:nvSpPr>
-        <p:spPr/>
-        <p:txBody>
-          <a:bodyPr/>
-          <a:lstStyle/>
-          <a:p>
-            <a:r>
-              <a:rPr lang="en-US" dirty="0"/>
-              <a:t>In-store technology on a counter</a:t>
-            </a:r>
-          </a:p>
-          <a:p>
-            <a:r>
-              <a:rPr lang="en-US" dirty="0"/>
-              <a:t>Future feature of browsing by product available on mobile devices</a:t>
-            </a:r>
-          </a:p>
-          <a:p>
-            <a:endParaRPr lang="en-US" dirty="0"/>
-          </a:p>
-        </p:txBody>
-      </p:sp>
+        </p:nvPicPr>
+        <p:blipFill>
+          <a:blip r:embed="rId2">
+            <a:extLst>
+              <a:ext uri="{28A0092B-C50C-407E-A947-70E740481C1C}">
+                <a14:useLocalDpi xmlns:a14="http://schemas.microsoft.com/office/drawing/2010/main" val="0"/>
+              </a:ext>
+            </a:extLst>
+          </a:blip>
+          <a:stretch>
+            <a:fillRect/>
+          </a:stretch>
+        </p:blipFill>
+        <p:spPr>
+          <a:xfrm>
+            <a:off x="4024985" y="0"/>
+            <a:ext cx="4138854" cy="6858085"/>
+          </a:xfrm>
+        </p:spPr>
+      </p:pic>
     </p:spTree>
     <p:extLst>
       <p:ext uri="{BB962C8B-B14F-4D97-AF65-F5344CB8AC3E}">
-        <p14:creationId xmlns:p14="http://schemas.microsoft.com/office/powerpoint/2010/main" val="4181864736"/>
+        <p14:creationId xmlns:p14="http://schemas.microsoft.com/office/powerpoint/2010/main" val="1803093204"/>
       </p:ext>
     </p:extLst>
   </p:cSld>
@@ -12932,10 +12975,165 @@
       </p:grpSpPr>
       <p:sp>
         <p:nvSpPr>
-          <p:cNvPr id="4" name="Title 3">
+          <p:cNvPr id="2" name="Title 1"/>
+          <p:cNvSpPr>
+            <a:spLocks noGrp="1"/>
+          </p:cNvSpPr>
+          <p:nvPr>
+            <p:ph type="title"/>
+          </p:nvPr>
+        </p:nvSpPr>
+        <p:spPr/>
+        <p:txBody>
+          <a:bodyPr/>
+          <a:lstStyle/>
+          <a:p>
+            <a:endParaRPr lang="en-US"/>
+          </a:p>
+        </p:txBody>
+      </p:sp>
+      <p:pic>
+        <p:nvPicPr>
+          <p:cNvPr id="4" name="Content Placeholder 3"/>
+          <p:cNvPicPr>
+            <a:picLocks noGrp="1" noChangeAspect="1"/>
+          </p:cNvPicPr>
+          <p:nvPr>
+            <p:ph idx="1"/>
+          </p:nvPr>
+        </p:nvPicPr>
+        <p:blipFill rotWithShape="1">
+          <a:blip r:embed="rId2">
+            <a:extLst>
+              <a:ext uri="{28A0092B-C50C-407E-A947-70E740481C1C}">
+                <a14:useLocalDpi xmlns:a14="http://schemas.microsoft.com/office/drawing/2010/main" val="0"/>
+              </a:ext>
+            </a:extLst>
+          </a:blip>
+          <a:srcRect t="121" b="-1"/>
+          <a:stretch/>
+        </p:blipFill>
+        <p:spPr>
+          <a:xfrm>
+            <a:off x="4168217" y="0"/>
+            <a:ext cx="3852389" cy="6858000"/>
+          </a:xfrm>
+        </p:spPr>
+      </p:pic>
+    </p:spTree>
+    <p:extLst>
+      <p:ext uri="{BB962C8B-B14F-4D97-AF65-F5344CB8AC3E}">
+        <p14:creationId xmlns:p14="http://schemas.microsoft.com/office/powerpoint/2010/main" val="1527218469"/>
+      </p:ext>
+    </p:extLst>
+  </p:cSld>
+  <p:clrMapOvr>
+    <a:masterClrMapping/>
+  </p:clrMapOvr>
+</p:sld>
+</file>
+
+<file path=ppt/slides/slide6.xml><?xml version="1.0" encoding="utf-8"?>
+<p:sld xmlns:a="http://schemas.openxmlformats.org/drawingml/2006/main" xmlns:r="http://schemas.openxmlformats.org/officeDocument/2006/relationships" xmlns:p="http://schemas.openxmlformats.org/presentationml/2006/main">
+  <p:cSld>
+    <p:spTree>
+      <p:nvGrpSpPr>
+        <p:cNvPr id="1" name=""/>
+        <p:cNvGrpSpPr/>
+        <p:nvPr/>
+      </p:nvGrpSpPr>
+      <p:grpSpPr>
+        <a:xfrm>
+          <a:off x="0" y="0"/>
+          <a:ext cx="0" cy="0"/>
+          <a:chOff x="0" y="0"/>
+          <a:chExt cx="0" cy="0"/>
+        </a:xfrm>
+      </p:grpSpPr>
+      <p:sp>
+        <p:nvSpPr>
+          <p:cNvPr id="2" name="Title 1"/>
+          <p:cNvSpPr>
+            <a:spLocks noGrp="1"/>
+          </p:cNvSpPr>
+          <p:nvPr>
+            <p:ph type="title"/>
+          </p:nvPr>
+        </p:nvSpPr>
+        <p:spPr/>
+        <p:txBody>
+          <a:bodyPr/>
+          <a:lstStyle/>
+          <a:p>
+            <a:endParaRPr lang="en-US"/>
+          </a:p>
+        </p:txBody>
+      </p:sp>
+      <p:pic>
+        <p:nvPicPr>
+          <p:cNvPr id="4" name="Content Placeholder 3"/>
+          <p:cNvPicPr>
+            <a:picLocks noGrp="1" noChangeAspect="1"/>
+          </p:cNvPicPr>
+          <p:nvPr>
+            <p:ph idx="1"/>
+          </p:nvPr>
+        </p:nvPicPr>
+        <p:blipFill>
+          <a:blip r:embed="rId2">
+            <a:extLst>
+              <a:ext uri="{28A0092B-C50C-407E-A947-70E740481C1C}">
+                <a14:useLocalDpi xmlns:a14="http://schemas.microsoft.com/office/drawing/2010/main" val="0"/>
+              </a:ext>
+            </a:extLst>
+          </a:blip>
+          <a:stretch>
+            <a:fillRect/>
+          </a:stretch>
+        </p:blipFill>
+        <p:spPr>
+          <a:xfrm>
+            <a:off x="4158036" y="0"/>
+            <a:ext cx="3872752" cy="6879833"/>
+          </a:xfrm>
+        </p:spPr>
+      </p:pic>
+    </p:spTree>
+    <p:extLst>
+      <p:ext uri="{BB962C8B-B14F-4D97-AF65-F5344CB8AC3E}">
+        <p14:creationId xmlns:p14="http://schemas.microsoft.com/office/powerpoint/2010/main" val="1464115667"/>
+      </p:ext>
+    </p:extLst>
+  </p:cSld>
+  <p:clrMapOvr>
+    <a:masterClrMapping/>
+  </p:clrMapOvr>
+</p:sld>
+</file>
+
+<file path=ppt/slides/slide7.xml><?xml version="1.0" encoding="utf-8"?>
+<p:sld xmlns:a="http://schemas.openxmlformats.org/drawingml/2006/main" xmlns:r="http://schemas.openxmlformats.org/officeDocument/2006/relationships" xmlns:p="http://schemas.openxmlformats.org/presentationml/2006/main">
+  <p:cSld>
+    <p:spTree>
+      <p:nvGrpSpPr>
+        <p:cNvPr id="1" name=""/>
+        <p:cNvGrpSpPr/>
+        <p:nvPr/>
+      </p:nvGrpSpPr>
+      <p:grpSpPr>
+        <a:xfrm>
+          <a:off x="0" y="0"/>
+          <a:ext cx="0" cy="0"/>
+          <a:chOff x="0" y="0"/>
+          <a:chExt cx="0" cy="0"/>
+        </a:xfrm>
+      </p:grpSpPr>
+      <p:sp>
+        <p:nvSpPr>
+          <p:cNvPr id="2" name="Title 1">
             <a:extLst>
               <a:ext uri="{FF2B5EF4-FFF2-40B4-BE49-F238E27FC236}">
-                <a16:creationId xmlns:a16="http://schemas.microsoft.com/office/drawing/2014/main" id="{2E5FFD92-4700-7046-A0E1-4B69F1FBDD24}"/>
+                <a16:creationId xmlns:a16="http://schemas.microsoft.com/office/drawing/2014/main" xmlns="" id="{9F7BCB68-720A-FE40-A6CE-92BF7EB86EBB}"/>
               </a:ext>
             </a:extLst>
           </p:cNvPr>
@@ -12953,17 +13151,17 @@
           <a:p>
             <a:r>
               <a:rPr lang="en-US" dirty="0"/>
-              <a:t>Next Steps</a:t>
+              <a:t>Applications</a:t>
             </a:r>
           </a:p>
         </p:txBody>
       </p:sp>
       <p:sp>
         <p:nvSpPr>
-          <p:cNvPr id="5" name="Content Placeholder 4">
+          <p:cNvPr id="3" name="Content Placeholder 2">
             <a:extLst>
               <a:ext uri="{FF2B5EF4-FFF2-40B4-BE49-F238E27FC236}">
-                <a16:creationId xmlns:a16="http://schemas.microsoft.com/office/drawing/2014/main" id="{29E9CEC8-3995-594A-B2B7-934D245F37EE}"/>
+                <a16:creationId xmlns:a16="http://schemas.microsoft.com/office/drawing/2014/main" xmlns="" id="{EBF91E89-3581-264C-9C09-7D2224503937}"/>
               </a:ext>
             </a:extLst>
           </p:cNvPr>
@@ -12981,6 +13179,149 @@
           <a:p>
             <a:r>
               <a:rPr lang="en-US" dirty="0"/>
+              <a:t>In-store technology on a counter</a:t>
+            </a:r>
+          </a:p>
+          <a:p>
+            <a:r>
+              <a:rPr lang="en-US" dirty="0"/>
+              <a:t>Future feature of browsing by product available on mobile devices</a:t>
+            </a:r>
+          </a:p>
+          <a:p>
+            <a:endParaRPr lang="en-US" dirty="0"/>
+          </a:p>
+        </p:txBody>
+      </p:sp>
+      <p:pic>
+        <p:nvPicPr>
+          <p:cNvPr id="3074" name="Picture 2" descr="mage result for in store tablets usage"/>
+          <p:cNvPicPr>
+            <a:picLocks noChangeAspect="1" noChangeArrowheads="1"/>
+          </p:cNvPicPr>
+          <p:nvPr/>
+        </p:nvPicPr>
+        <p:blipFill>
+          <a:blip r:embed="rId2">
+            <a:extLst>
+              <a:ext uri="{28A0092B-C50C-407E-A947-70E740481C1C}">
+                <a14:useLocalDpi xmlns:a14="http://schemas.microsoft.com/office/drawing/2010/main" val="0"/>
+              </a:ext>
+            </a:extLst>
+          </a:blip>
+          <a:srcRect/>
+          <a:stretch>
+            <a:fillRect/>
+          </a:stretch>
+        </p:blipFill>
+        <p:spPr bwMode="auto">
+          <a:xfrm>
+            <a:off x="4229752" y="3657601"/>
+            <a:ext cx="3729318" cy="2484598"/>
+          </a:xfrm>
+          <a:prstGeom prst="rect">
+            <a:avLst/>
+          </a:prstGeom>
+          <a:noFill/>
+          <a:extLst>
+            <a:ext uri="{909E8E84-426E-40DD-AFC4-6F175D3DCCD1}">
+              <a14:hiddenFill xmlns:a14="http://schemas.microsoft.com/office/drawing/2010/main">
+                <a:solidFill>
+                  <a:srgbClr val="FFFFFF"/>
+                </a:solidFill>
+              </a14:hiddenFill>
+            </a:ext>
+          </a:extLst>
+        </p:spPr>
+      </p:pic>
+    </p:spTree>
+    <p:extLst>
+      <p:ext uri="{BB962C8B-B14F-4D97-AF65-F5344CB8AC3E}">
+        <p14:creationId xmlns:p14="http://schemas.microsoft.com/office/powerpoint/2010/main" val="4181864736"/>
+      </p:ext>
+    </p:extLst>
+  </p:cSld>
+  <p:clrMapOvr>
+    <a:masterClrMapping/>
+  </p:clrMapOvr>
+  <p:timing>
+    <p:tnLst>
+      <p:par>
+        <p:cTn id="1" dur="indefinite" restart="never" nodeType="tmRoot"/>
+      </p:par>
+    </p:tnLst>
+  </p:timing>
+</p:sld>
+</file>
+
+<file path=ppt/slides/slide8.xml><?xml version="1.0" encoding="utf-8"?>
+<p:sld xmlns:a="http://schemas.openxmlformats.org/drawingml/2006/main" xmlns:r="http://schemas.openxmlformats.org/officeDocument/2006/relationships" xmlns:p="http://schemas.openxmlformats.org/presentationml/2006/main">
+  <p:cSld>
+    <p:spTree>
+      <p:nvGrpSpPr>
+        <p:cNvPr id="1" name=""/>
+        <p:cNvGrpSpPr/>
+        <p:nvPr/>
+      </p:nvGrpSpPr>
+      <p:grpSpPr>
+        <a:xfrm>
+          <a:off x="0" y="0"/>
+          <a:ext cx="0" cy="0"/>
+          <a:chOff x="0" y="0"/>
+          <a:chExt cx="0" cy="0"/>
+        </a:xfrm>
+      </p:grpSpPr>
+      <p:sp>
+        <p:nvSpPr>
+          <p:cNvPr id="4" name="Title 3">
+            <a:extLst>
+              <a:ext uri="{FF2B5EF4-FFF2-40B4-BE49-F238E27FC236}">
+                <a16:creationId xmlns:a16="http://schemas.microsoft.com/office/drawing/2014/main" xmlns="" id="{2E5FFD92-4700-7046-A0E1-4B69F1FBDD24}"/>
+              </a:ext>
+            </a:extLst>
+          </p:cNvPr>
+          <p:cNvSpPr>
+            <a:spLocks noGrp="1"/>
+          </p:cNvSpPr>
+          <p:nvPr>
+            <p:ph type="title"/>
+          </p:nvPr>
+        </p:nvSpPr>
+        <p:spPr/>
+        <p:txBody>
+          <a:bodyPr/>
+          <a:lstStyle/>
+          <a:p>
+            <a:r>
+              <a:rPr lang="en-US" dirty="0"/>
+              <a:t>Next Steps</a:t>
+            </a:r>
+          </a:p>
+        </p:txBody>
+      </p:sp>
+      <p:sp>
+        <p:nvSpPr>
+          <p:cNvPr id="5" name="Content Placeholder 4">
+            <a:extLst>
+              <a:ext uri="{FF2B5EF4-FFF2-40B4-BE49-F238E27FC236}">
+                <a16:creationId xmlns:a16="http://schemas.microsoft.com/office/drawing/2014/main" xmlns="" id="{29E9CEC8-3995-594A-B2B7-934D245F37EE}"/>
+              </a:ext>
+            </a:extLst>
+          </p:cNvPr>
+          <p:cNvSpPr>
+            <a:spLocks noGrp="1"/>
+          </p:cNvSpPr>
+          <p:nvPr>
+            <p:ph idx="1"/>
+          </p:nvPr>
+        </p:nvSpPr>
+        <p:spPr/>
+        <p:txBody>
+          <a:bodyPr/>
+          <a:lstStyle/>
+          <a:p>
+            <a:r>
+              <a:rPr lang="en-US" dirty="0"/>
               <a:t>Creating a database with all products’ information</a:t>
             </a:r>
           </a:p>
@@ -13004,6 +13345,47 @@
           </a:p>
         </p:txBody>
       </p:sp>
+      <p:pic>
+        <p:nvPicPr>
+          <p:cNvPr id="2050" name="Picture 2" descr="mage result for estée lauder companies"/>
+          <p:cNvPicPr>
+            <a:picLocks noChangeAspect="1" noChangeArrowheads="1"/>
+          </p:cNvPicPr>
+          <p:nvPr/>
+        </p:nvPicPr>
+        <p:blipFill>
+          <a:blip r:embed="rId2">
+            <a:extLst>
+              <a:ext uri="{28A0092B-C50C-407E-A947-70E740481C1C}">
+                <a14:useLocalDpi xmlns:a14="http://schemas.microsoft.com/office/drawing/2010/main" val="0"/>
+              </a:ext>
+            </a:extLst>
+          </a:blip>
+          <a:srcRect/>
+          <a:stretch>
+            <a:fillRect/>
+          </a:stretch>
+        </p:blipFill>
+        <p:spPr bwMode="auto">
+          <a:xfrm>
+            <a:off x="5114910" y="618518"/>
+            <a:ext cx="1960095" cy="1174423"/>
+          </a:xfrm>
+          <a:prstGeom prst="rect">
+            <a:avLst/>
+          </a:prstGeom>
+          <a:noFill/>
+          <a:extLst>
+            <a:ext uri="{909E8E84-426E-40DD-AFC4-6F175D3DCCD1}">
+              <a14:hiddenFill xmlns:a14="http://schemas.microsoft.com/office/drawing/2010/main">
+                <a:solidFill>
+                  <a:srgbClr val="FFFFFF"/>
+                </a:solidFill>
+              </a14:hiddenFill>
+            </a:ext>
+          </a:extLst>
+        </p:spPr>
+      </p:pic>
     </p:spTree>
     <p:extLst>
       <p:ext uri="{BB962C8B-B14F-4D97-AF65-F5344CB8AC3E}">
@@ -13014,6 +13396,13 @@
   <p:clrMapOvr>
     <a:masterClrMapping/>
   </p:clrMapOvr>
+  <p:timing>
+    <p:tnLst>
+      <p:par>
+        <p:cTn id="1" dur="indefinite" restart="never" nodeType="tmRoot"/>
+      </p:par>
+    </p:tnLst>
+  </p:timing>
 </p:sld>
 </file>
 

</xml_diff>